<commit_message>
changed /*{{value: to /*{{values:
</commit_message>
<xml_diff>
--- a/sets/demo/AgeReport.pptx
+++ b/sets/demo/AgeReport.pptx
@@ -1477,7 +1477,7 @@
       </p:grpSpPr>
       <p:sp>
         <p:nvSpPr>
-          <p:cNvPr id="2" name="Content Placeholder 1" descr="/*{{value:birthday.csv}}*/">
+          <p:cNvPr id="2" name="Content Placeholder 1" descr="/*{{values:birthday.csv}}*/">
             <a:extLst>
               <a:ext uri="{FF2B5EF4-FFF2-40B4-BE49-F238E27FC236}">
                 <a16:creationId xmlns:a16="http://schemas.microsoft.com/office/drawing/2014/main" id="{F97D998F-66F4-C946-B466-CDDEBACD4777}"/>
@@ -2331,18 +2331,18 @@
 </file>
 
 <file path=customXml/item1.xml><?xml version="1.0" encoding="utf-8"?>
-<p:properties xmlns:p="http://schemas.microsoft.com/office/2006/metadata/properties" xmlns:xsi="http://www.w3.org/2001/XMLSchema-instance" xmlns:pc="http://schemas.microsoft.com/office/infopath/2007/PartnerControls">
-  <documentManagement/>
-</p:properties>
-</file>
-
-<file path=customXml/item2.xml><?xml version="1.0" encoding="utf-8"?>
 <?mso-contentType ?>
 <FormTemplates xmlns="http://schemas.microsoft.com/sharepoint/v3/contenttype/forms">
   <Display>DocumentLibraryForm</Display>
   <Edit>DocumentLibraryForm</Edit>
   <New>DocumentLibraryForm</New>
 </FormTemplates>
+</file>
+
+<file path=customXml/item2.xml><?xml version="1.0" encoding="utf-8"?>
+<p:properties xmlns:p="http://schemas.microsoft.com/office/2006/metadata/properties" xmlns:xsi="http://www.w3.org/2001/XMLSchema-instance" xmlns:pc="http://schemas.microsoft.com/office/infopath/2007/PartnerControls">
+  <documentManagement/>
+</p:properties>
 </file>
 
 <file path=customXml/item3.xml><?xml version="1.0" encoding="utf-8"?>
@@ -2557,6 +2557,14 @@
 </file>
 
 <file path=customXml/itemProps1.xml><?xml version="1.0" encoding="utf-8"?>
+<ds:datastoreItem xmlns:ds="http://schemas.openxmlformats.org/officeDocument/2006/customXml" ds:itemID="{027D0A69-7C10-4C42-B337-3FE1EF648C0F}">
+  <ds:schemaRefs>
+    <ds:schemaRef ds:uri="http://schemas.microsoft.com/sharepoint/v3/contenttype/forms"/>
+  </ds:schemaRefs>
+</ds:datastoreItem>
+</file>
+
+<file path=customXml/itemProps2.xml><?xml version="1.0" encoding="utf-8"?>
 <ds:datastoreItem xmlns:ds="http://schemas.openxmlformats.org/officeDocument/2006/customXml" ds:itemID="{DEA338E5-26D2-4988-85C9-AE66D978EB05}">
   <ds:schemaRefs>
     <ds:schemaRef ds:uri="http://purl.org/dc/terms/"/>
@@ -2569,14 +2577,6 @@
     <ds:schemaRef ds:uri="http://schemas.microsoft.com/office/2006/metadata/properties"/>
     <ds:schemaRef ds:uri="http://schemas.microsoft.com/office/infopath/2007/PartnerControls"/>
     <ds:schemaRef ds:uri="7d2247ee-dcae-49b5-8e6a-08fc19cc9b93"/>
-  </ds:schemaRefs>
-</ds:datastoreItem>
-</file>
-
-<file path=customXml/itemProps2.xml><?xml version="1.0" encoding="utf-8"?>
-<ds:datastoreItem xmlns:ds="http://schemas.openxmlformats.org/officeDocument/2006/customXml" ds:itemID="{027D0A69-7C10-4C42-B337-3FE1EF648C0F}">
-  <ds:schemaRefs>
-    <ds:schemaRef ds:uri="http://schemas.microsoft.com/sharepoint/v3/contenttype/forms"/>
   </ds:schemaRefs>
 </ds:datastoreItem>
 </file>

</xml_diff>